<commit_message>
made all files consitent
</commit_message>
<xml_diff>
--- a/translations/en-us/RobotGame/PassiveAttachments.pptx
+++ b/translations/en-us/RobotGame/PassiveAttachments.pptx
@@ -2146,7 +2146,7 @@
           <a:noFill/>
           <a:extLst>
             <a:ext uri="{909E8E84-426E-40dd-AFC4-6F175D3DCCD1}">
-              <a14:hiddenFill xmlns:a14="http://schemas.microsoft.com/office/drawing/2010/main" xmlns="">
+              <a14:hiddenFill xmlns="" xmlns:a14="http://schemas.microsoft.com/office/drawing/2010/main">
                 <a:solidFill>
                   <a:srgbClr val="FFFFFF"/>
                 </a:solidFill>
@@ -29005,7 +29005,7 @@
             <a:pPr algn="ctr"/>
             <a:r>
               <a:rPr lang="en-US" dirty="0"/>
-              <a:t>Robot DESIGN Lesson</a:t>
+              <a:t>Passive attachments</a:t>
             </a:r>
           </a:p>
         </p:txBody>
@@ -29026,9 +29026,10 @@
           <a:lstStyle/>
           <a:p>
             <a:r>
-              <a:rPr lang="en-US" dirty="0"/>
-              <a:t>Passive Attachments</a:t>
-            </a:r>
+              <a:rPr lang="en-US"/>
+              <a:t>Seshan brothers</a:t>
+            </a:r>
+            <a:endParaRPr lang="en-US" dirty="0"/>
           </a:p>
         </p:txBody>
       </p:sp>
@@ -30514,7 +30515,7 @@
           <a:effectLst/>
           <a:extLst>
             <a:ext uri="{91240B29-F687-4f45-9708-019B960494DF}">
-              <a14:hiddenLine xmlns="" xmlns:a14="http://schemas.microsoft.com/office/drawing/2010/main" w="9525">
+              <a14:hiddenLine xmlns:a14="http://schemas.microsoft.com/office/drawing/2010/main" xmlns="" w="9525">
                 <a:solidFill>
                   <a:schemeClr val="tx1"/>
                 </a:solidFill>
@@ -30524,7 +30525,7 @@
               </a14:hiddenLine>
             </a:ext>
             <a:ext uri="{AF507438-7753-43e0-B8FC-AC1667EBCBE1}">
-              <a14:hiddenEffects xmlns="" xmlns:a14="http://schemas.microsoft.com/office/drawing/2010/main">
+              <a14:hiddenEffects xmlns:a14="http://schemas.microsoft.com/office/drawing/2010/main" xmlns="">
                 <a:effectLst>
                   <a:outerShdw dist="35921" dir="2700000" algn="ctr" rotWithShape="0">
                     <a:schemeClr val="bg2"/>
@@ -30865,7 +30866,7 @@
           <a:noFill/>
           <a:extLst>
             <a:ext uri="{909E8E84-426E-40dd-AFC4-6F175D3DCCD1}">
-              <a14:hiddenFill xmlns="" xmlns:a14="http://schemas.microsoft.com/office/drawing/2010/main">
+              <a14:hiddenFill xmlns:a14="http://schemas.microsoft.com/office/drawing/2010/main" xmlns="">
                 <a:solidFill>
                   <a:srgbClr val="FFFFFF"/>
                 </a:solidFill>

</xml_diff>